<commit_message>
Add bidi properies to he-IL templates
</commit_message>
<xml_diff>
--- a/new/he-IL/new.pptx
+++ b/new/he-IL/new.pptx
@@ -1,6 +1,6 @@
 
 <file path=ppt/presentation.xml><?xml version="1.0" encoding="utf-8"?>
-<p:presentation xmlns:a="http://schemas.openxmlformats.org/drawingml/2006/main" xmlns:r="http://schemas.openxmlformats.org/officeDocument/2006/relationships" xmlns:p="http://schemas.openxmlformats.org/presentationml/2006/main" xmlns:m="http://schemas.openxmlformats.org/officeDocument/2006/math" xmlns:w="http://schemas.openxmlformats.org/wordprocessingml/2006/main" saveSubsetFonts="1">
+<p:presentation xmlns:a="http://schemas.openxmlformats.org/drawingml/2006/main" xmlns:r="http://schemas.openxmlformats.org/officeDocument/2006/relationships" xmlns:p="http://schemas.openxmlformats.org/presentationml/2006/main" xmlns:m="http://schemas.openxmlformats.org/officeDocument/2006/math" xmlns:w="http://schemas.openxmlformats.org/wordprocessingml/2006/main" rtl="1" saveSubsetFonts="1">
   <p:sldMasterIdLst>
     <p:sldMasterId id="2147483648" r:id="rId1"/>
   </p:sldMasterIdLst>
@@ -16,7 +16,7 @@
     <a:defPPr>
       <a:defRPr lang="he-IL"/>
     </a:defPPr>
-    <a:lvl1pPr marL="0" algn="l" defTabSz="914400" rtl="0" eaLnBrk="1" latinLnBrk="0" hangingPunct="1">
+    <a:lvl1pPr marL="0" algn="r" defTabSz="914400" rtl="1" eaLnBrk="1" latinLnBrk="0" hangingPunct="1">
       <a:defRPr sz="1800" kern="1200">
         <a:solidFill>
           <a:schemeClr val="tx1"/>
@@ -26,7 +26,7 @@
         <a:cs typeface="+mn-cs"/>
       </a:defRPr>
     </a:lvl1pPr>
-    <a:lvl2pPr marL="457200" algn="l" defTabSz="914400" rtl="0" eaLnBrk="1" latinLnBrk="0" hangingPunct="1">
+    <a:lvl2pPr marL="457200" algn="r" defTabSz="914400" rtl="1" eaLnBrk="1" latinLnBrk="0" hangingPunct="1">
       <a:defRPr sz="1800" kern="1200">
         <a:solidFill>
           <a:schemeClr val="tx1"/>
@@ -36,7 +36,7 @@
         <a:cs typeface="+mn-cs"/>
       </a:defRPr>
     </a:lvl2pPr>
-    <a:lvl3pPr marL="914400" algn="l" defTabSz="914400" rtl="0" eaLnBrk="1" latinLnBrk="0" hangingPunct="1">
+    <a:lvl3pPr marL="914400" algn="r" defTabSz="914400" rtl="1" eaLnBrk="1" latinLnBrk="0" hangingPunct="1">
       <a:defRPr sz="1800" kern="1200">
         <a:solidFill>
           <a:schemeClr val="tx1"/>
@@ -46,7 +46,7 @@
         <a:cs typeface="+mn-cs"/>
       </a:defRPr>
     </a:lvl3pPr>
-    <a:lvl4pPr marL="1371600" algn="l" defTabSz="914400" rtl="0" eaLnBrk="1" latinLnBrk="0" hangingPunct="1">
+    <a:lvl4pPr marL="1371600" algn="r" defTabSz="914400" rtl="1" eaLnBrk="1" latinLnBrk="0" hangingPunct="1">
       <a:defRPr sz="1800" kern="1200">
         <a:solidFill>
           <a:schemeClr val="tx1"/>
@@ -56,7 +56,7 @@
         <a:cs typeface="+mn-cs"/>
       </a:defRPr>
     </a:lvl4pPr>
-    <a:lvl5pPr marL="1828800" algn="l" defTabSz="914400" rtl="0" eaLnBrk="1" latinLnBrk="0" hangingPunct="1">
+    <a:lvl5pPr marL="1828800" algn="r" defTabSz="914400" rtl="1" eaLnBrk="1" latinLnBrk="0" hangingPunct="1">
       <a:defRPr sz="1800" kern="1200">
         <a:solidFill>
           <a:schemeClr val="tx1"/>
@@ -66,7 +66,7 @@
         <a:cs typeface="+mn-cs"/>
       </a:defRPr>
     </a:lvl5pPr>
-    <a:lvl6pPr marL="2286000" algn="l" defTabSz="914400" rtl="0" eaLnBrk="1" latinLnBrk="0" hangingPunct="1">
+    <a:lvl6pPr marL="2286000" algn="r" defTabSz="914400" rtl="1" eaLnBrk="1" latinLnBrk="0" hangingPunct="1">
       <a:defRPr sz="1800" kern="1200">
         <a:solidFill>
           <a:schemeClr val="tx1"/>
@@ -76,7 +76,7 @@
         <a:cs typeface="+mn-cs"/>
       </a:defRPr>
     </a:lvl6pPr>
-    <a:lvl7pPr marL="2743200" algn="l" defTabSz="914400" rtl="0" eaLnBrk="1" latinLnBrk="0" hangingPunct="1">
+    <a:lvl7pPr marL="2743200" algn="r" defTabSz="914400" rtl="1" eaLnBrk="1" latinLnBrk="0" hangingPunct="1">
       <a:defRPr sz="1800" kern="1200">
         <a:solidFill>
           <a:schemeClr val="tx1"/>
@@ -86,7 +86,7 @@
         <a:cs typeface="+mn-cs"/>
       </a:defRPr>
     </a:lvl7pPr>
-    <a:lvl8pPr marL="3200400" algn="l" defTabSz="914400" rtl="0" eaLnBrk="1" latinLnBrk="0" hangingPunct="1">
+    <a:lvl8pPr marL="3200400" algn="r" defTabSz="914400" rtl="1" eaLnBrk="1" latinLnBrk="0" hangingPunct="1">
       <a:defRPr sz="1800" kern="1200">
         <a:solidFill>
           <a:schemeClr val="tx1"/>
@@ -96,7 +96,7 @@
         <a:cs typeface="+mn-cs"/>
       </a:defRPr>
     </a:lvl8pPr>
-    <a:lvl9pPr marL="3657600" algn="l" defTabSz="914400" rtl="0" eaLnBrk="1" latinLnBrk="0" hangingPunct="1">
+    <a:lvl9pPr marL="3657600" algn="r" defTabSz="914400" rtl="1" eaLnBrk="1" latinLnBrk="0" hangingPunct="1">
       <a:defRPr sz="1800" kern="1200">
         <a:solidFill>
           <a:schemeClr val="tx1"/>
@@ -152,9 +152,9 @@
           </a:prstGeom>
         </p:spPr>
         <p:txBody>
-          <a:bodyPr vert="horz" lIns="91440" tIns="45720" rIns="91440" bIns="45720" rtlCol="0"/>
+          <a:bodyPr vert="horz" lIns="91440" tIns="45720" rIns="91440" bIns="45720" rtlCol="1"/>
           <a:lstStyle>
-            <a:lvl1pPr algn="l">
+            <a:lvl1pPr algn="r">
               <a:defRPr sz="1200"/>
             </a:lvl1pPr>
           </a:lstStyle>
@@ -183,7 +183,7 @@
           </a:prstGeom>
         </p:spPr>
         <p:txBody>
-          <a:bodyPr vert="horz" lIns="91440" tIns="45720" rIns="91440" bIns="45720" rtlCol="0"/>
+          <a:bodyPr vert="horz" lIns="91440" tIns="45720" rIns="91440" bIns="45720" rtlCol="1"/>
           <a:lstStyle>
             <a:lvl1pPr algn="r">
               <a:defRPr sz="1200"/>
@@ -224,7 +224,7 @@
           </a:ln>
         </p:spPr>
         <p:txBody>
-          <a:bodyPr vert="horz" lIns="91440" tIns="45720" rIns="91440" bIns="45720" rtlCol="0" anchor="ctr"/>
+          <a:bodyPr vert="horz" lIns="91440" tIns="45720" rIns="91440" bIns="45720" rtlCol="1" anchor="ctr"/>
           <a:lstStyle/>
           <a:p>
             <a:endParaRPr lang="he-IL"/>
@@ -251,7 +251,7 @@
           </a:prstGeom>
         </p:spPr>
         <p:txBody>
-          <a:bodyPr vert="horz" lIns="91440" tIns="45720" rIns="91440" bIns="45720" rtlCol="0"/>
+          <a:bodyPr vert="horz" lIns="91440" tIns="45720" rIns="91440" bIns="45720" rtlCol="1"/>
           <a:lstStyle/>
           <a:p>
             <a:pPr lvl="0"/>
@@ -311,9 +311,9 @@
           </a:prstGeom>
         </p:spPr>
         <p:txBody>
-          <a:bodyPr vert="horz" lIns="91440" tIns="45720" rIns="91440" bIns="45720" rtlCol="0" anchor="b"/>
+          <a:bodyPr vert="horz" lIns="91440" tIns="45720" rIns="91440" bIns="45720" rtlCol="1" anchor="b"/>
           <a:lstStyle>
-            <a:lvl1pPr algn="l">
+            <a:lvl1pPr algn="r">
               <a:defRPr sz="1200"/>
             </a:lvl1pPr>
           </a:lstStyle>
@@ -342,7 +342,7 @@
           </a:prstGeom>
         </p:spPr>
         <p:txBody>
-          <a:bodyPr vert="horz" lIns="91440" tIns="45720" rIns="91440" bIns="45720" rtlCol="0" anchor="b"/>
+          <a:bodyPr vert="horz" lIns="91440" tIns="45720" rIns="91440" bIns="45720" rtlCol="1" anchor="b"/>
           <a:lstStyle>
             <a:lvl1pPr algn="r">
               <a:defRPr sz="1200"/>
@@ -361,7 +361,7 @@
   </p:cSld>
   <p:clrMap bg1="lt1" tx1="dk1" bg2="lt2" tx2="dk2" accent1="accent1" accent2="accent2" accent3="accent3" accent4="accent4" accent5="accent5" accent6="accent6" hlink="hlink" folHlink="folHlink"/>
   <p:notesStyle>
-    <a:lvl1pPr marL="0" algn="l" defTabSz="914400" rtl="0" eaLnBrk="1" latinLnBrk="0" hangingPunct="1">
+    <a:lvl1pPr marL="0" algn="r" defTabSz="914400" rtl="1" eaLnBrk="1" latinLnBrk="0" hangingPunct="1">
       <a:defRPr sz="1200" kern="1200">
         <a:solidFill>
           <a:schemeClr val="tx1"/>
@@ -371,7 +371,7 @@
         <a:cs typeface="+mn-cs"/>
       </a:defRPr>
     </a:lvl1pPr>
-    <a:lvl2pPr marL="457200" algn="l" defTabSz="914400" rtl="0" eaLnBrk="1" latinLnBrk="0" hangingPunct="1">
+    <a:lvl2pPr marL="457200" algn="r" defTabSz="914400" rtl="1" eaLnBrk="1" latinLnBrk="0" hangingPunct="1">
       <a:defRPr sz="1200" kern="1200">
         <a:solidFill>
           <a:schemeClr val="tx1"/>
@@ -381,7 +381,7 @@
         <a:cs typeface="+mn-cs"/>
       </a:defRPr>
     </a:lvl2pPr>
-    <a:lvl3pPr marL="914400" algn="l" defTabSz="914400" rtl="0" eaLnBrk="1" latinLnBrk="0" hangingPunct="1">
+    <a:lvl3pPr marL="914400" algn="r" defTabSz="914400" rtl="1" eaLnBrk="1" latinLnBrk="0" hangingPunct="1">
       <a:defRPr sz="1200" kern="1200">
         <a:solidFill>
           <a:schemeClr val="tx1"/>
@@ -391,7 +391,7 @@
         <a:cs typeface="+mn-cs"/>
       </a:defRPr>
     </a:lvl3pPr>
-    <a:lvl4pPr marL="1371600" algn="l" defTabSz="914400" rtl="0" eaLnBrk="1" latinLnBrk="0" hangingPunct="1">
+    <a:lvl4pPr marL="1371600" algn="r" defTabSz="914400" rtl="1" eaLnBrk="1" latinLnBrk="0" hangingPunct="1">
       <a:defRPr sz="1200" kern="1200">
         <a:solidFill>
           <a:schemeClr val="tx1"/>
@@ -401,7 +401,7 @@
         <a:cs typeface="+mn-cs"/>
       </a:defRPr>
     </a:lvl4pPr>
-    <a:lvl5pPr marL="1828800" algn="l" defTabSz="914400" rtl="0" eaLnBrk="1" latinLnBrk="0" hangingPunct="1">
+    <a:lvl5pPr marL="1828800" algn="r" defTabSz="914400" rtl="1" eaLnBrk="1" latinLnBrk="0" hangingPunct="1">
       <a:defRPr sz="1200" kern="1200">
         <a:solidFill>
           <a:schemeClr val="tx1"/>
@@ -411,7 +411,7 @@
         <a:cs typeface="+mn-cs"/>
       </a:defRPr>
     </a:lvl5pPr>
-    <a:lvl6pPr marL="2286000" algn="l" defTabSz="914400" rtl="0" eaLnBrk="1" latinLnBrk="0" hangingPunct="1">
+    <a:lvl6pPr marL="2286000" algn="r" defTabSz="914400" rtl="1" eaLnBrk="1" latinLnBrk="0" hangingPunct="1">
       <a:defRPr sz="1200" kern="1200">
         <a:solidFill>
           <a:schemeClr val="tx1"/>
@@ -421,7 +421,7 @@
         <a:cs typeface="+mn-cs"/>
       </a:defRPr>
     </a:lvl6pPr>
-    <a:lvl7pPr marL="2743200" algn="l" defTabSz="914400" rtl="0" eaLnBrk="1" latinLnBrk="0" hangingPunct="1">
+    <a:lvl7pPr marL="2743200" algn="r" defTabSz="914400" rtl="1" eaLnBrk="1" latinLnBrk="0" hangingPunct="1">
       <a:defRPr sz="1200" kern="1200">
         <a:solidFill>
           <a:schemeClr val="tx1"/>
@@ -431,7 +431,7 @@
         <a:cs typeface="+mn-cs"/>
       </a:defRPr>
     </a:lvl7pPr>
-    <a:lvl8pPr marL="3200400" algn="l" defTabSz="914400" rtl="0" eaLnBrk="1" latinLnBrk="0" hangingPunct="1">
+    <a:lvl8pPr marL="3200400" algn="r" defTabSz="914400" rtl="1" eaLnBrk="1" latinLnBrk="0" hangingPunct="1">
       <a:defRPr sz="1200" kern="1200">
         <a:solidFill>
           <a:schemeClr val="tx1"/>
@@ -441,7 +441,7 @@
         <a:cs typeface="+mn-cs"/>
       </a:defRPr>
     </a:lvl8pPr>
-    <a:lvl9pPr marL="3657600" algn="l" defTabSz="914400" rtl="0" eaLnBrk="1" latinLnBrk="0" hangingPunct="1">
+    <a:lvl9pPr marL="3657600" algn="r" defTabSz="914400" rtl="1" eaLnBrk="1" latinLnBrk="0" hangingPunct="1">
       <a:defRPr sz="1200" kern="1200">
         <a:solidFill>
           <a:schemeClr val="tx1"/>
@@ -2833,7 +2833,7 @@
           </a:prstGeom>
         </p:spPr>
         <p:txBody>
-          <a:bodyPr vert="horz" lIns="91440" tIns="45720" rIns="91440" bIns="45720" rtlCol="0" anchor="ctr">
+          <a:bodyPr vert="horz" lIns="91440" tIns="45720" rIns="91440" bIns="45720" rtlCol="1" anchor="ctr">
             <a:normAutofit/>
           </a:bodyPr>
           <a:lstStyle/>
@@ -2866,7 +2866,7 @@
           </a:prstGeom>
         </p:spPr>
         <p:txBody>
-          <a:bodyPr vert="horz" lIns="91440" tIns="45720" rIns="91440" bIns="45720" rtlCol="0">
+          <a:bodyPr vert="horz" lIns="91440" tIns="45720" rIns="91440" bIns="45720" rtlCol="1">
             <a:normAutofit/>
           </a:bodyPr>
           <a:lstStyle/>
@@ -2928,9 +2928,9 @@
           </a:prstGeom>
         </p:spPr>
         <p:txBody>
-          <a:bodyPr vert="horz" lIns="91440" tIns="45720" rIns="91440" bIns="45720" rtlCol="0" anchor="ctr"/>
+          <a:bodyPr vert="horz" lIns="91440" tIns="45720" rIns="91440" bIns="45720" rtlCol="1" anchor="ctr"/>
           <a:lstStyle>
-            <a:lvl1pPr algn="l">
+            <a:lvl1pPr algn="r">
               <a:defRPr sz="1200">
                 <a:solidFill>
                   <a:schemeClr val="tx1">
@@ -2969,7 +2969,7 @@
           </a:prstGeom>
         </p:spPr>
         <p:txBody>
-          <a:bodyPr vert="horz" lIns="91440" tIns="45720" rIns="91440" bIns="45720" rtlCol="0" anchor="ctr"/>
+          <a:bodyPr vert="horz" lIns="91440" tIns="45720" rIns="91440" bIns="45720" rtlCol="1" anchor="ctr"/>
           <a:lstStyle>
             <a:lvl1pPr algn="ctr">
               <a:defRPr sz="1200">
@@ -3006,7 +3006,7 @@
           </a:prstGeom>
         </p:spPr>
         <p:txBody>
-          <a:bodyPr vert="horz" lIns="91440" tIns="45720" rIns="91440" bIns="45720" rtlCol="0" anchor="ctr"/>
+          <a:bodyPr vert="horz" lIns="91440" tIns="45720" rIns="91440" bIns="45720" rtlCol="1" anchor="ctr"/>
           <a:lstStyle>
             <a:lvl1pPr algn="r">
               <a:defRPr sz="1200">
@@ -3045,7 +3045,7 @@
   </p:sldLayoutIdLst>
   <p:txStyles>
     <p:titleStyle>
-      <a:lvl1pPr algn="l" defTabSz="914400" rtl="0" eaLnBrk="1" latinLnBrk="0" hangingPunct="1">
+      <a:lvl1pPr algn="r" defTabSz="914400" rtl="1" eaLnBrk="1" latinLnBrk="0" hangingPunct="1">
         <a:lnSpc>
           <a:spcPct val="90000"/>
         </a:lnSpc>
@@ -3064,7 +3064,7 @@
       </a:lvl1pPr>
     </p:titleStyle>
     <p:bodyStyle>
-      <a:lvl1pPr marL="228600" indent="-228600" algn="l" defTabSz="914400" rtl="0" eaLnBrk="1" latinLnBrk="0" hangingPunct="1">
+      <a:lvl1pPr marL="228600" indent="-228600" algn="r" defTabSz="914400" rtl="1" eaLnBrk="1" latinLnBrk="0" hangingPunct="1">
         <a:lnSpc>
           <a:spcPct val="90000"/>
         </a:lnSpc>
@@ -3082,7 +3082,7 @@
           <a:cs typeface="+mn-cs"/>
         </a:defRPr>
       </a:lvl1pPr>
-      <a:lvl2pPr marL="685800" indent="-228600" algn="l" defTabSz="914400" rtl="0" eaLnBrk="1" latinLnBrk="0" hangingPunct="1">
+      <a:lvl2pPr marL="685800" indent="-228600" algn="r" defTabSz="914400" rtl="1" eaLnBrk="1" latinLnBrk="0" hangingPunct="1">
         <a:lnSpc>
           <a:spcPct val="90000"/>
         </a:lnSpc>
@@ -3100,7 +3100,7 @@
           <a:cs typeface="+mn-cs"/>
         </a:defRPr>
       </a:lvl2pPr>
-      <a:lvl3pPr marL="1143000" indent="-228600" algn="l" defTabSz="914400" rtl="0" eaLnBrk="1" latinLnBrk="0" hangingPunct="1">
+      <a:lvl3pPr marL="1143000" indent="-228600" algn="r" defTabSz="914400" rtl="1" eaLnBrk="1" latinLnBrk="0" hangingPunct="1">
         <a:lnSpc>
           <a:spcPct val="90000"/>
         </a:lnSpc>
@@ -3118,7 +3118,7 @@
           <a:cs typeface="+mn-cs"/>
         </a:defRPr>
       </a:lvl3pPr>
-      <a:lvl4pPr marL="1600200" indent="-228600" algn="l" defTabSz="914400" rtl="0" eaLnBrk="1" latinLnBrk="0" hangingPunct="1">
+      <a:lvl4pPr marL="1600200" indent="-228600" algn="r" defTabSz="914400" rtl="1" eaLnBrk="1" latinLnBrk="0" hangingPunct="1">
         <a:lnSpc>
           <a:spcPct val="90000"/>
         </a:lnSpc>
@@ -3136,7 +3136,7 @@
           <a:cs typeface="+mn-cs"/>
         </a:defRPr>
       </a:lvl4pPr>
-      <a:lvl5pPr marL="2057400" indent="-228600" algn="l" defTabSz="914400" rtl="0" eaLnBrk="1" latinLnBrk="0" hangingPunct="1">
+      <a:lvl5pPr marL="2057400" indent="-228600" algn="r" defTabSz="914400" rtl="1" eaLnBrk="1" latinLnBrk="0" hangingPunct="1">
         <a:lnSpc>
           <a:spcPct val="90000"/>
         </a:lnSpc>
@@ -3154,7 +3154,7 @@
           <a:cs typeface="+mn-cs"/>
         </a:defRPr>
       </a:lvl5pPr>
-      <a:lvl6pPr marL="2514600" indent="-228600" algn="l" defTabSz="914400" rtl="0" eaLnBrk="1" latinLnBrk="0" hangingPunct="1">
+      <a:lvl6pPr marL="2514600" indent="-228600" algn="r" defTabSz="914400" rtl="1" eaLnBrk="1" latinLnBrk="0" hangingPunct="1">
         <a:lnSpc>
           <a:spcPct val="90000"/>
         </a:lnSpc>
@@ -3172,7 +3172,7 @@
           <a:cs typeface="+mn-cs"/>
         </a:defRPr>
       </a:lvl6pPr>
-      <a:lvl7pPr marL="2971800" indent="-228600" algn="l" defTabSz="914400" rtl="0" eaLnBrk="1" latinLnBrk="0" hangingPunct="1">
+      <a:lvl7pPr marL="2971800" indent="-228600" algn="r" defTabSz="914400" rtl="1" eaLnBrk="1" latinLnBrk="0" hangingPunct="1">
         <a:lnSpc>
           <a:spcPct val="90000"/>
         </a:lnSpc>
@@ -3190,7 +3190,7 @@
           <a:cs typeface="+mn-cs"/>
         </a:defRPr>
       </a:lvl7pPr>
-      <a:lvl8pPr marL="3429000" indent="-228600" algn="l" defTabSz="914400" rtl="0" eaLnBrk="1" latinLnBrk="0" hangingPunct="1">
+      <a:lvl8pPr marL="3429000" indent="-228600" algn="r" defTabSz="914400" rtl="1" eaLnBrk="1" latinLnBrk="0" hangingPunct="1">
         <a:lnSpc>
           <a:spcPct val="90000"/>
         </a:lnSpc>
@@ -3208,7 +3208,7 @@
           <a:cs typeface="+mn-cs"/>
         </a:defRPr>
       </a:lvl8pPr>
-      <a:lvl9pPr marL="3886200" indent="-228600" algn="l" defTabSz="914400" rtl="0" eaLnBrk="1" latinLnBrk="0" hangingPunct="1">
+      <a:lvl9pPr marL="3886200" indent="-228600" algn="r" defTabSz="914400" rtl="1" eaLnBrk="1" latinLnBrk="0" hangingPunct="1">
         <a:lnSpc>
           <a:spcPct val="90000"/>
         </a:lnSpc>
@@ -3231,7 +3231,7 @@
       <a:defPPr>
         <a:defRPr lang="he-IL"/>
       </a:defPPr>
-      <a:lvl1pPr marL="0" algn="l" defTabSz="914400" rtl="0" eaLnBrk="1" latinLnBrk="0" hangingPunct="1">
+      <a:lvl1pPr marL="0" algn="r" defTabSz="914400" rtl="1" eaLnBrk="1" latinLnBrk="0" hangingPunct="1">
         <a:defRPr sz="1800" kern="1200">
           <a:solidFill>
             <a:schemeClr val="tx1"/>
@@ -3241,7 +3241,7 @@
           <a:cs typeface="+mn-cs"/>
         </a:defRPr>
       </a:lvl1pPr>
-      <a:lvl2pPr marL="457200" algn="l" defTabSz="914400" rtl="0" eaLnBrk="1" latinLnBrk="0" hangingPunct="1">
+      <a:lvl2pPr marL="457200" algn="r" defTabSz="914400" rtl="1" eaLnBrk="1" latinLnBrk="0" hangingPunct="1">
         <a:defRPr sz="1800" kern="1200">
           <a:solidFill>
             <a:schemeClr val="tx1"/>
@@ -3251,7 +3251,7 @@
           <a:cs typeface="+mn-cs"/>
         </a:defRPr>
       </a:lvl2pPr>
-      <a:lvl3pPr marL="914400" algn="l" defTabSz="914400" rtl="0" eaLnBrk="1" latinLnBrk="0" hangingPunct="1">
+      <a:lvl3pPr marL="914400" algn="r" defTabSz="914400" rtl="1" eaLnBrk="1" latinLnBrk="0" hangingPunct="1">
         <a:defRPr sz="1800" kern="1200">
           <a:solidFill>
             <a:schemeClr val="tx1"/>
@@ -3261,7 +3261,7 @@
           <a:cs typeface="+mn-cs"/>
         </a:defRPr>
       </a:lvl3pPr>
-      <a:lvl4pPr marL="1371600" algn="l" defTabSz="914400" rtl="0" eaLnBrk="1" latinLnBrk="0" hangingPunct="1">
+      <a:lvl4pPr marL="1371600" algn="r" defTabSz="914400" rtl="1" eaLnBrk="1" latinLnBrk="0" hangingPunct="1">
         <a:defRPr sz="1800" kern="1200">
           <a:solidFill>
             <a:schemeClr val="tx1"/>
@@ -3271,7 +3271,7 @@
           <a:cs typeface="+mn-cs"/>
         </a:defRPr>
       </a:lvl4pPr>
-      <a:lvl5pPr marL="1828800" algn="l" defTabSz="914400" rtl="0" eaLnBrk="1" latinLnBrk="0" hangingPunct="1">
+      <a:lvl5pPr marL="1828800" algn="r" defTabSz="914400" rtl="1" eaLnBrk="1" latinLnBrk="0" hangingPunct="1">
         <a:defRPr sz="1800" kern="1200">
           <a:solidFill>
             <a:schemeClr val="tx1"/>
@@ -3281,7 +3281,7 @@
           <a:cs typeface="+mn-cs"/>
         </a:defRPr>
       </a:lvl5pPr>
-      <a:lvl6pPr marL="2286000" algn="l" defTabSz="914400" rtl="0" eaLnBrk="1" latinLnBrk="0" hangingPunct="1">
+      <a:lvl6pPr marL="2286000" algn="r" defTabSz="914400" rtl="1" eaLnBrk="1" latinLnBrk="0" hangingPunct="1">
         <a:defRPr sz="1800" kern="1200">
           <a:solidFill>
             <a:schemeClr val="tx1"/>
@@ -3291,7 +3291,7 @@
           <a:cs typeface="+mn-cs"/>
         </a:defRPr>
       </a:lvl6pPr>
-      <a:lvl7pPr marL="2743200" algn="l" defTabSz="914400" rtl="0" eaLnBrk="1" latinLnBrk="0" hangingPunct="1">
+      <a:lvl7pPr marL="2743200" algn="r" defTabSz="914400" rtl="1" eaLnBrk="1" latinLnBrk="0" hangingPunct="1">
         <a:defRPr sz="1800" kern="1200">
           <a:solidFill>
             <a:schemeClr val="tx1"/>
@@ -3301,7 +3301,7 @@
           <a:cs typeface="+mn-cs"/>
         </a:defRPr>
       </a:lvl7pPr>
-      <a:lvl8pPr marL="3200400" algn="l" defTabSz="914400" rtl="0" eaLnBrk="1" latinLnBrk="0" hangingPunct="1">
+      <a:lvl8pPr marL="3200400" algn="r" defTabSz="914400" rtl="1" eaLnBrk="1" latinLnBrk="0" hangingPunct="1">
         <a:defRPr sz="1800" kern="1200">
           <a:solidFill>
             <a:schemeClr val="tx1"/>
@@ -3311,7 +3311,7 @@
           <a:cs typeface="+mn-cs"/>
         </a:defRPr>
       </a:lvl8pPr>
-      <a:lvl9pPr marL="3657600" algn="l" defTabSz="914400" rtl="0" eaLnBrk="1" latinLnBrk="0" hangingPunct="1">
+      <a:lvl9pPr marL="3657600" algn="r" defTabSz="914400" rtl="1" eaLnBrk="1" latinLnBrk="0" hangingPunct="1">
         <a:defRPr sz="1800" kern="1200">
           <a:solidFill>
             <a:schemeClr val="tx1"/>

</xml_diff>